<commit_message>
Edits to the guide
</commit_message>
<xml_diff>
--- a/docs/images/fortigate-architecture-diagram.pptx
+++ b/docs/images/fortigate-architecture-diagram.pptx
@@ -5732,7 +5732,7 @@
         </p:nvSpPr>
         <p:spPr>
           <a:xfrm>
-            <a:off x="2861676" y="1944284"/>
+            <a:off x="2895966" y="1944284"/>
             <a:ext cx="657720" cy="242340"/>
           </a:xfrm>
           <a:prstGeom prst="rect">
@@ -6186,8 +6186,8 @@
         </p:nvSpPr>
         <p:spPr>
           <a:xfrm>
-            <a:off x="1343693" y="1606614"/>
-            <a:ext cx="2084880" cy="602068"/>
+            <a:off x="1264436" y="1603778"/>
+            <a:ext cx="2221535" cy="602068"/>
           </a:xfrm>
           <a:prstGeom prst="rect">
             <a:avLst/>
@@ -6606,8 +6606,8 @@
         </p:nvSpPr>
         <p:spPr>
           <a:xfrm>
-            <a:off x="843053" y="2381802"/>
-            <a:ext cx="3086160" cy="608230"/>
+            <a:off x="808518" y="2381802"/>
+            <a:ext cx="3120695" cy="608230"/>
           </a:xfrm>
           <a:prstGeom prst="rect">
             <a:avLst/>
@@ -6722,7 +6722,7 @@
         </p:blipFill>
         <p:spPr>
           <a:xfrm>
-            <a:off x="2312337" y="1599887"/>
+            <a:off x="2308446" y="1597004"/>
             <a:ext cx="148490" cy="148490"/>
           </a:xfrm>
           <a:prstGeom prst="rect">
@@ -6912,7 +6912,7 @@
         </p:nvSpPr>
         <p:spPr>
           <a:xfrm>
-            <a:off x="1235936" y="1951272"/>
+            <a:off x="1213076" y="1951272"/>
             <a:ext cx="657720" cy="242340"/>
           </a:xfrm>
           <a:prstGeom prst="rect">
@@ -6955,7 +6955,16 @@
                 <a:cs typeface="Calibri"/>
                 <a:sym typeface="Calibri"/>
               </a:rPr>
-              <a:t>(main)</a:t>
+              <a:t>(</a:t>
+            </a:r>
+            <a:r>
+              <a:rPr lang="en-GB" sz="630" dirty="0" smtClean="0">
+                <a:latin typeface="+mn-lt"/>
+                <a:ea typeface="Calibri"/>
+                <a:cs typeface="Calibri"/>
+                <a:sym typeface="Calibri"/>
+              </a:rPr>
+              <a:t>main, BYOL)</a:t>
             </a:r>
             <a:endParaRPr sz="770" dirty="0">
               <a:latin typeface="+mn-lt"/>
@@ -6971,8 +6980,8 @@
         </p:nvSpPr>
         <p:spPr>
           <a:xfrm>
-            <a:off x="874788" y="2728441"/>
-            <a:ext cx="657720" cy="242340"/>
+            <a:off x="808518" y="2728441"/>
+            <a:ext cx="791682" cy="242340"/>
           </a:xfrm>
           <a:prstGeom prst="rect">
             <a:avLst/>
@@ -7013,7 +7022,16 @@
                 <a:cs typeface="Calibri"/>
                 <a:sym typeface="Calibri"/>
               </a:rPr>
-              <a:t>(host)</a:t>
+              <a:t>(</a:t>
+            </a:r>
+            <a:r>
+              <a:rPr lang="en-GB" sz="630" dirty="0" smtClean="0">
+                <a:latin typeface="+mn-lt"/>
+                <a:ea typeface="Calibri"/>
+                <a:cs typeface="Calibri"/>
+                <a:sym typeface="Calibri"/>
+              </a:rPr>
+              <a:t>host, on-demand)</a:t>
             </a:r>
             <a:endParaRPr sz="630" dirty="0">
               <a:latin typeface="+mn-lt"/>
@@ -7190,7 +7208,7 @@
         </p:nvCxnSpPr>
         <p:spPr>
           <a:xfrm>
-            <a:off x="3186149" y="1151689"/>
+            <a:off x="3220439" y="1151689"/>
             <a:ext cx="1553" cy="583978"/>
           </a:xfrm>
           <a:prstGeom prst="straightConnector1">
@@ -7216,7 +7234,7 @@
         </p:nvCxnSpPr>
         <p:spPr>
           <a:xfrm>
-            <a:off x="1574157" y="1140028"/>
+            <a:off x="1539867" y="1140028"/>
             <a:ext cx="643" cy="589424"/>
           </a:xfrm>
           <a:prstGeom prst="straightConnector1">
@@ -7323,7 +7341,7 @@
         </p:blipFill>
         <p:spPr bwMode="auto">
           <a:xfrm>
-            <a:off x="3067564" y="1733011"/>
+            <a:off x="3101854" y="1733011"/>
             <a:ext cx="241790" cy="241790"/>
           </a:xfrm>
           <a:prstGeom prst="rect">
@@ -7383,7 +7401,7 @@
         </p:blipFill>
         <p:spPr bwMode="auto">
           <a:xfrm>
-            <a:off x="1456119" y="1733011"/>
+            <a:off x="1421829" y="1733011"/>
             <a:ext cx="241790" cy="241790"/>
           </a:xfrm>
           <a:prstGeom prst="rect">
@@ -7637,8 +7655,8 @@
         </p:blipFill>
         <p:spPr>
           <a:xfrm>
-            <a:off x="2312337" y="2374997"/>
-            <a:ext cx="148490" cy="148490"/>
+            <a:off x="2308446" y="2374523"/>
+            <a:ext cx="136534" cy="141685"/>
           </a:xfrm>
           <a:prstGeom prst="rect">
             <a:avLst/>

</xml_diff>